<commit_message>
Update SURVIVAL RATIO PLOTS_For survey.pptx
added plot interpretation on plots
</commit_message>
<xml_diff>
--- a/SURVIVAL RATIO PLOTS_For survey.pptx
+++ b/SURVIVAL RATIO PLOTS_For survey.pptx
@@ -5,24 +5,27 @@
     <p:sldMasterId id="2147483648" r:id="rId1"/>
   </p:sldMasterIdLst>
   <p:notesMasterIdLst>
-    <p:notesMasterId r:id="rId17"/>
+    <p:notesMasterId r:id="rId20"/>
   </p:notesMasterIdLst>
   <p:sldIdLst>
     <p:sldId id="256" r:id="rId2"/>
     <p:sldId id="270" r:id="rId3"/>
     <p:sldId id="261" r:id="rId4"/>
-    <p:sldId id="257" r:id="rId5"/>
-    <p:sldId id="262" r:id="rId6"/>
-    <p:sldId id="258" r:id="rId7"/>
-    <p:sldId id="265" r:id="rId8"/>
-    <p:sldId id="259" r:id="rId9"/>
-    <p:sldId id="263" r:id="rId10"/>
-    <p:sldId id="260" r:id="rId11"/>
-    <p:sldId id="264" r:id="rId12"/>
-    <p:sldId id="266" r:id="rId13"/>
-    <p:sldId id="267" r:id="rId14"/>
-    <p:sldId id="268" r:id="rId15"/>
-    <p:sldId id="269" r:id="rId16"/>
+    <p:sldId id="273" r:id="rId5"/>
+    <p:sldId id="257" r:id="rId6"/>
+    <p:sldId id="271" r:id="rId7"/>
+    <p:sldId id="262" r:id="rId8"/>
+    <p:sldId id="272" r:id="rId9"/>
+    <p:sldId id="258" r:id="rId10"/>
+    <p:sldId id="265" r:id="rId11"/>
+    <p:sldId id="259" r:id="rId12"/>
+    <p:sldId id="263" r:id="rId13"/>
+    <p:sldId id="260" r:id="rId14"/>
+    <p:sldId id="264" r:id="rId15"/>
+    <p:sldId id="266" r:id="rId16"/>
+    <p:sldId id="267" r:id="rId17"/>
+    <p:sldId id="268" r:id="rId18"/>
+    <p:sldId id="269" r:id="rId19"/>
   </p:sldIdLst>
   <p:sldSz cx="12192000" cy="6858000"/>
   <p:notesSz cx="6858000" cy="9144000"/>
@@ -544,6 +547,174 @@
             <a:fld id="{2D38F873-1FB9-4338-9F6C-70E30775B7F5}" type="slidenum">
               <a:rPr lang="en-US" smtClean="0"/>
               <a:t>5</a:t>
+            </a:fld>
+            <a:endParaRPr lang="en-US"/>
+          </a:p>
+        </p:txBody>
+      </p:sp>
+    </p:spTree>
+    <p:extLst>
+      <p:ext uri="{BB962C8B-B14F-4D97-AF65-F5344CB8AC3E}">
+        <p14:creationId xmlns:p14="http://schemas.microsoft.com/office/powerpoint/2010/main" val="1343152919"/>
+      </p:ext>
+    </p:extLst>
+  </p:cSld>
+  <p:clrMapOvr>
+    <a:masterClrMapping/>
+  </p:clrMapOvr>
+</p:notes>
+</file>
+
+<file path=ppt/notesSlides/notesSlide2.xml><?xml version="1.0" encoding="utf-8"?>
+<p:notes xmlns:a="http://schemas.openxmlformats.org/drawingml/2006/main" xmlns:r="http://schemas.openxmlformats.org/officeDocument/2006/relationships" xmlns:p="http://schemas.openxmlformats.org/presentationml/2006/main">
+  <p:cSld>
+    <p:spTree>
+      <p:nvGrpSpPr>
+        <p:cNvPr id="1" name=""/>
+        <p:cNvGrpSpPr/>
+        <p:nvPr/>
+      </p:nvGrpSpPr>
+      <p:grpSpPr>
+        <a:xfrm>
+          <a:off x="0" y="0"/>
+          <a:ext cx="0" cy="0"/>
+          <a:chOff x="0" y="0"/>
+          <a:chExt cx="0" cy="0"/>
+        </a:xfrm>
+      </p:grpSpPr>
+      <p:sp>
+        <p:nvSpPr>
+          <p:cNvPr id="2" name="Slide Image Placeholder 1"/>
+          <p:cNvSpPr>
+            <a:spLocks noGrp="1" noRot="1" noChangeAspect="1"/>
+          </p:cNvSpPr>
+          <p:nvPr>
+            <p:ph type="sldImg"/>
+          </p:nvPr>
+        </p:nvSpPr>
+        <p:spPr/>
+      </p:sp>
+      <p:sp>
+        <p:nvSpPr>
+          <p:cNvPr id="3" name="Notes Placeholder 2"/>
+          <p:cNvSpPr>
+            <a:spLocks noGrp="1"/>
+          </p:cNvSpPr>
+          <p:nvPr>
+            <p:ph type="body" idx="1"/>
+          </p:nvPr>
+        </p:nvSpPr>
+        <p:spPr/>
+        <p:txBody>
+          <a:bodyPr/>
+          <a:lstStyle/>
+          <a:p>
+            <a:endParaRPr lang="en-US" dirty="0"/>
+          </a:p>
+        </p:txBody>
+      </p:sp>
+      <p:sp>
+        <p:nvSpPr>
+          <p:cNvPr id="4" name="Slide Number Placeholder 3"/>
+          <p:cNvSpPr>
+            <a:spLocks noGrp="1"/>
+          </p:cNvSpPr>
+          <p:nvPr>
+            <p:ph type="sldNum" sz="quarter" idx="5"/>
+          </p:nvPr>
+        </p:nvSpPr>
+        <p:spPr/>
+        <p:txBody>
+          <a:bodyPr/>
+          <a:lstStyle/>
+          <a:p>
+            <a:fld id="{2D38F873-1FB9-4338-9F6C-70E30775B7F5}" type="slidenum">
+              <a:rPr lang="en-US" smtClean="0"/>
+              <a:t>6</a:t>
+            </a:fld>
+            <a:endParaRPr lang="en-US"/>
+          </a:p>
+        </p:txBody>
+      </p:sp>
+    </p:spTree>
+    <p:extLst>
+      <p:ext uri="{BB962C8B-B14F-4D97-AF65-F5344CB8AC3E}">
+        <p14:creationId xmlns:p14="http://schemas.microsoft.com/office/powerpoint/2010/main" val="3318946218"/>
+      </p:ext>
+    </p:extLst>
+  </p:cSld>
+  <p:clrMapOvr>
+    <a:masterClrMapping/>
+  </p:clrMapOvr>
+</p:notes>
+</file>
+
+<file path=ppt/notesSlides/notesSlide3.xml><?xml version="1.0" encoding="utf-8"?>
+<p:notes xmlns:a="http://schemas.openxmlformats.org/drawingml/2006/main" xmlns:r="http://schemas.openxmlformats.org/officeDocument/2006/relationships" xmlns:p="http://schemas.openxmlformats.org/presentationml/2006/main">
+  <p:cSld>
+    <p:spTree>
+      <p:nvGrpSpPr>
+        <p:cNvPr id="1" name=""/>
+        <p:cNvGrpSpPr/>
+        <p:nvPr/>
+      </p:nvGrpSpPr>
+      <p:grpSpPr>
+        <a:xfrm>
+          <a:off x="0" y="0"/>
+          <a:ext cx="0" cy="0"/>
+          <a:chOff x="0" y="0"/>
+          <a:chExt cx="0" cy="0"/>
+        </a:xfrm>
+      </p:grpSpPr>
+      <p:sp>
+        <p:nvSpPr>
+          <p:cNvPr id="2" name="Slide Image Placeholder 1"/>
+          <p:cNvSpPr>
+            <a:spLocks noGrp="1" noRot="1" noChangeAspect="1"/>
+          </p:cNvSpPr>
+          <p:nvPr>
+            <p:ph type="sldImg"/>
+          </p:nvPr>
+        </p:nvSpPr>
+        <p:spPr/>
+      </p:sp>
+      <p:sp>
+        <p:nvSpPr>
+          <p:cNvPr id="3" name="Notes Placeholder 2"/>
+          <p:cNvSpPr>
+            <a:spLocks noGrp="1"/>
+          </p:cNvSpPr>
+          <p:nvPr>
+            <p:ph type="body" idx="1"/>
+          </p:nvPr>
+        </p:nvSpPr>
+        <p:spPr/>
+        <p:txBody>
+          <a:bodyPr/>
+          <a:lstStyle/>
+          <a:p>
+            <a:endParaRPr lang="en-US" dirty="0"/>
+          </a:p>
+        </p:txBody>
+      </p:sp>
+      <p:sp>
+        <p:nvSpPr>
+          <p:cNvPr id="4" name="Slide Number Placeholder 3"/>
+          <p:cNvSpPr>
+            <a:spLocks noGrp="1"/>
+          </p:cNvSpPr>
+          <p:nvPr>
+            <p:ph type="sldNum" sz="quarter" idx="5"/>
+          </p:nvPr>
+        </p:nvSpPr>
+        <p:spPr/>
+        <p:txBody>
+          <a:bodyPr/>
+          <a:lstStyle/>
+          <a:p>
+            <a:fld id="{2D38F873-1FB9-4338-9F6C-70E30775B7F5}" type="slidenum">
+              <a:rPr lang="en-US" smtClean="0"/>
+              <a:t>7</a:t>
             </a:fld>
             <a:endParaRPr lang="en-US"/>
           </a:p>
@@ -3867,6 +4038,344 @@
           <p:cNvPr id="2" name="Title 1">
             <a:extLst>
               <a:ext uri="{FF2B5EF4-FFF2-40B4-BE49-F238E27FC236}">
+                <a16:creationId xmlns:a16="http://schemas.microsoft.com/office/drawing/2014/main" id="{0A5867AA-ABE1-BFC6-14CF-BE54ADB2A5F4}"/>
+              </a:ext>
+            </a:extLst>
+          </p:cNvPr>
+          <p:cNvSpPr>
+            <a:spLocks noGrp="1"/>
+          </p:cNvSpPr>
+          <p:nvPr>
+            <p:ph type="title"/>
+          </p:nvPr>
+        </p:nvSpPr>
+        <p:spPr/>
+        <p:txBody>
+          <a:bodyPr/>
+          <a:lstStyle/>
+          <a:p>
+            <a:endParaRPr lang="en-US"/>
+          </a:p>
+        </p:txBody>
+      </p:sp>
+      <p:pic>
+        <p:nvPicPr>
+          <p:cNvPr id="6" name="Content Placeholder 5">
+            <a:extLst>
+              <a:ext uri="{FF2B5EF4-FFF2-40B4-BE49-F238E27FC236}">
+                <a16:creationId xmlns:a16="http://schemas.microsoft.com/office/drawing/2014/main" id="{43B5CA57-09CB-A6C7-5880-5B7F7FD708EB}"/>
+              </a:ext>
+            </a:extLst>
+          </p:cNvPr>
+          <p:cNvPicPr>
+            <a:picLocks noGrp="1" noChangeAspect="1"/>
+          </p:cNvPicPr>
+          <p:nvPr>
+            <p:ph sz="half" idx="1"/>
+          </p:nvPr>
+        </p:nvPicPr>
+        <p:blipFill>
+          <a:blip r:embed="rId2"/>
+          <a:stretch>
+            <a:fillRect/>
+          </a:stretch>
+        </p:blipFill>
+        <p:spPr>
+          <a:xfrm>
+            <a:off x="838200" y="2399312"/>
+            <a:ext cx="5181600" cy="3203964"/>
+          </a:xfrm>
+        </p:spPr>
+      </p:pic>
+      <p:sp>
+        <p:nvSpPr>
+          <p:cNvPr id="4" name="Content Placeholder 3">
+            <a:extLst>
+              <a:ext uri="{FF2B5EF4-FFF2-40B4-BE49-F238E27FC236}">
+                <a16:creationId xmlns:a16="http://schemas.microsoft.com/office/drawing/2014/main" id="{251E9359-3D55-1618-2144-D5571F605AAA}"/>
+              </a:ext>
+            </a:extLst>
+          </p:cNvPr>
+          <p:cNvSpPr>
+            <a:spLocks noGrp="1"/>
+          </p:cNvSpPr>
+          <p:nvPr>
+            <p:ph sz="half" idx="2"/>
+          </p:nvPr>
+        </p:nvSpPr>
+        <p:spPr/>
+        <p:txBody>
+          <a:bodyPr/>
+          <a:lstStyle/>
+          <a:p>
+            <a:endParaRPr lang="en-US"/>
+          </a:p>
+        </p:txBody>
+      </p:sp>
+    </p:spTree>
+    <p:extLst>
+      <p:ext uri="{BB962C8B-B14F-4D97-AF65-F5344CB8AC3E}">
+        <p14:creationId xmlns:p14="http://schemas.microsoft.com/office/powerpoint/2010/main" val="1706119969"/>
+      </p:ext>
+    </p:extLst>
+  </p:cSld>
+  <p:clrMapOvr>
+    <a:masterClrMapping/>
+  </p:clrMapOvr>
+</p:sld>
+</file>
+
+<file path=ppt/slides/slide11.xml><?xml version="1.0" encoding="utf-8"?>
+<p:sld xmlns:a="http://schemas.openxmlformats.org/drawingml/2006/main" xmlns:r="http://schemas.openxmlformats.org/officeDocument/2006/relationships" xmlns:p="http://schemas.openxmlformats.org/presentationml/2006/main">
+  <p:cSld>
+    <p:spTree>
+      <p:nvGrpSpPr>
+        <p:cNvPr id="1" name=""/>
+        <p:cNvGrpSpPr/>
+        <p:nvPr/>
+      </p:nvGrpSpPr>
+      <p:grpSpPr>
+        <a:xfrm>
+          <a:off x="0" y="0"/>
+          <a:ext cx="0" cy="0"/>
+          <a:chOff x="0" y="0"/>
+          <a:chExt cx="0" cy="0"/>
+        </a:xfrm>
+      </p:grpSpPr>
+      <p:sp>
+        <p:nvSpPr>
+          <p:cNvPr id="2" name="Title 1">
+            <a:extLst>
+              <a:ext uri="{FF2B5EF4-FFF2-40B4-BE49-F238E27FC236}">
+                <a16:creationId xmlns:a16="http://schemas.microsoft.com/office/drawing/2014/main" id="{4F803FAB-AB4E-ECEB-B87D-CF608FC42219}"/>
+              </a:ext>
+            </a:extLst>
+          </p:cNvPr>
+          <p:cNvSpPr>
+            <a:spLocks noGrp="1"/>
+          </p:cNvSpPr>
+          <p:nvPr>
+            <p:ph type="title"/>
+          </p:nvPr>
+        </p:nvSpPr>
+        <p:spPr/>
+        <p:txBody>
+          <a:bodyPr/>
+          <a:lstStyle/>
+          <a:p>
+            <a:r>
+              <a:rPr lang="en-US" b="1" dirty="0"/>
+              <a:t>Comparison of survival between Pathologic stage I and II</a:t>
+            </a:r>
+          </a:p>
+        </p:txBody>
+      </p:sp>
+      <p:pic>
+        <p:nvPicPr>
+          <p:cNvPr id="12" name="Content Placeholder 11">
+            <a:extLst>
+              <a:ext uri="{FF2B5EF4-FFF2-40B4-BE49-F238E27FC236}">
+                <a16:creationId xmlns:a16="http://schemas.microsoft.com/office/drawing/2014/main" id="{DBBCD6A8-BE88-6622-B2CC-427706A4EA86}"/>
+              </a:ext>
+            </a:extLst>
+          </p:cNvPr>
+          <p:cNvPicPr>
+            <a:picLocks noGrp="1" noChangeAspect="1"/>
+          </p:cNvPicPr>
+          <p:nvPr>
+            <p:ph sz="half" idx="2"/>
+          </p:nvPr>
+        </p:nvPicPr>
+        <p:blipFill>
+          <a:blip r:embed="rId2"/>
+          <a:stretch>
+            <a:fillRect/>
+          </a:stretch>
+        </p:blipFill>
+        <p:spPr>
+          <a:xfrm>
+            <a:off x="6172200" y="2385795"/>
+            <a:ext cx="5181600" cy="3230997"/>
+          </a:xfrm>
+        </p:spPr>
+      </p:pic>
+      <p:pic>
+        <p:nvPicPr>
+          <p:cNvPr id="6" name="Content Placeholder 5">
+            <a:extLst>
+              <a:ext uri="{FF2B5EF4-FFF2-40B4-BE49-F238E27FC236}">
+                <a16:creationId xmlns:a16="http://schemas.microsoft.com/office/drawing/2014/main" id="{9C01982B-C606-776A-3844-2B12D74BC582}"/>
+              </a:ext>
+            </a:extLst>
+          </p:cNvPr>
+          <p:cNvPicPr>
+            <a:picLocks noGrp="1" noChangeAspect="1"/>
+          </p:cNvPicPr>
+          <p:nvPr>
+            <p:ph sz="half" idx="1"/>
+          </p:nvPr>
+        </p:nvPicPr>
+        <p:blipFill>
+          <a:blip r:embed="rId3"/>
+          <a:stretch>
+            <a:fillRect/>
+          </a:stretch>
+        </p:blipFill>
+        <p:spPr>
+          <a:xfrm>
+            <a:off x="838200" y="2452446"/>
+            <a:ext cx="5181600" cy="3097695"/>
+          </a:xfrm>
+        </p:spPr>
+      </p:pic>
+    </p:spTree>
+    <p:extLst>
+      <p:ext uri="{BB962C8B-B14F-4D97-AF65-F5344CB8AC3E}">
+        <p14:creationId xmlns:p14="http://schemas.microsoft.com/office/powerpoint/2010/main" val="3437497039"/>
+      </p:ext>
+    </p:extLst>
+  </p:cSld>
+  <p:clrMapOvr>
+    <a:masterClrMapping/>
+  </p:clrMapOvr>
+</p:sld>
+</file>
+
+<file path=ppt/slides/slide12.xml><?xml version="1.0" encoding="utf-8"?>
+<p:sld xmlns:a="http://schemas.openxmlformats.org/drawingml/2006/main" xmlns:r="http://schemas.openxmlformats.org/officeDocument/2006/relationships" xmlns:p="http://schemas.openxmlformats.org/presentationml/2006/main">
+  <p:cSld>
+    <p:spTree>
+      <p:nvGrpSpPr>
+        <p:cNvPr id="1" name=""/>
+        <p:cNvGrpSpPr/>
+        <p:nvPr/>
+      </p:nvGrpSpPr>
+      <p:grpSpPr>
+        <a:xfrm>
+          <a:off x="0" y="0"/>
+          <a:ext cx="0" cy="0"/>
+          <a:chOff x="0" y="0"/>
+          <a:chExt cx="0" cy="0"/>
+        </a:xfrm>
+      </p:grpSpPr>
+      <p:sp>
+        <p:nvSpPr>
+          <p:cNvPr id="2" name="Title 1">
+            <a:extLst>
+              <a:ext uri="{FF2B5EF4-FFF2-40B4-BE49-F238E27FC236}">
+                <a16:creationId xmlns:a16="http://schemas.microsoft.com/office/drawing/2014/main" id="{F0E93CA7-2387-85CD-98A2-89153EFD7CE9}"/>
+              </a:ext>
+            </a:extLst>
+          </p:cNvPr>
+          <p:cNvSpPr>
+            <a:spLocks noGrp="1"/>
+          </p:cNvSpPr>
+          <p:nvPr>
+            <p:ph type="title"/>
+          </p:nvPr>
+        </p:nvSpPr>
+        <p:spPr/>
+        <p:txBody>
+          <a:bodyPr/>
+          <a:lstStyle/>
+          <a:p>
+            <a:r>
+              <a:rPr lang="en-US" b="1" dirty="0"/>
+              <a:t>Comparison of survival between Pathologic stage I and II</a:t>
+            </a:r>
+            <a:endParaRPr lang="en-US" dirty="0"/>
+          </a:p>
+        </p:txBody>
+      </p:sp>
+      <p:pic>
+        <p:nvPicPr>
+          <p:cNvPr id="6" name="Content Placeholder 5">
+            <a:extLst>
+              <a:ext uri="{FF2B5EF4-FFF2-40B4-BE49-F238E27FC236}">
+                <a16:creationId xmlns:a16="http://schemas.microsoft.com/office/drawing/2014/main" id="{9E333A2F-DE77-44D2-6259-95D2A281717D}"/>
+              </a:ext>
+            </a:extLst>
+          </p:cNvPr>
+          <p:cNvPicPr>
+            <a:picLocks noGrp="1" noChangeAspect="1"/>
+          </p:cNvPicPr>
+          <p:nvPr>
+            <p:ph sz="half" idx="1"/>
+          </p:nvPr>
+        </p:nvPicPr>
+        <p:blipFill>
+          <a:blip r:embed="rId2"/>
+          <a:stretch>
+            <a:fillRect/>
+          </a:stretch>
+        </p:blipFill>
+        <p:spPr>
+          <a:xfrm>
+            <a:off x="838200" y="2446814"/>
+            <a:ext cx="5181600" cy="3108959"/>
+          </a:xfrm>
+        </p:spPr>
+      </p:pic>
+      <p:sp>
+        <p:nvSpPr>
+          <p:cNvPr id="4" name="Content Placeholder 3">
+            <a:extLst>
+              <a:ext uri="{FF2B5EF4-FFF2-40B4-BE49-F238E27FC236}">
+                <a16:creationId xmlns:a16="http://schemas.microsoft.com/office/drawing/2014/main" id="{209E8BC9-F17E-7D49-33D1-5154892B61C2}"/>
+              </a:ext>
+            </a:extLst>
+          </p:cNvPr>
+          <p:cNvSpPr>
+            <a:spLocks noGrp="1"/>
+          </p:cNvSpPr>
+          <p:nvPr>
+            <p:ph sz="half" idx="2"/>
+          </p:nvPr>
+        </p:nvSpPr>
+        <p:spPr/>
+        <p:txBody>
+          <a:bodyPr/>
+          <a:lstStyle/>
+          <a:p>
+            <a:endParaRPr lang="en-US"/>
+          </a:p>
+        </p:txBody>
+      </p:sp>
+    </p:spTree>
+    <p:extLst>
+      <p:ext uri="{BB962C8B-B14F-4D97-AF65-F5344CB8AC3E}">
+        <p14:creationId xmlns:p14="http://schemas.microsoft.com/office/powerpoint/2010/main" val="2445845414"/>
+      </p:ext>
+    </p:extLst>
+  </p:cSld>
+  <p:clrMapOvr>
+    <a:masterClrMapping/>
+  </p:clrMapOvr>
+</p:sld>
+</file>
+
+<file path=ppt/slides/slide13.xml><?xml version="1.0" encoding="utf-8"?>
+<p:sld xmlns:a="http://schemas.openxmlformats.org/drawingml/2006/main" xmlns:r="http://schemas.openxmlformats.org/officeDocument/2006/relationships" xmlns:p="http://schemas.openxmlformats.org/presentationml/2006/main">
+  <p:cSld>
+    <p:spTree>
+      <p:nvGrpSpPr>
+        <p:cNvPr id="1" name=""/>
+        <p:cNvGrpSpPr/>
+        <p:nvPr/>
+      </p:nvGrpSpPr>
+      <p:grpSpPr>
+        <a:xfrm>
+          <a:off x="0" y="0"/>
+          <a:ext cx="0" cy="0"/>
+          <a:chOff x="0" y="0"/>
+          <a:chExt cx="0" cy="0"/>
+        </a:xfrm>
+      </p:grpSpPr>
+      <p:sp>
+        <p:nvSpPr>
+          <p:cNvPr id="2" name="Title 1">
+            <a:extLst>
+              <a:ext uri="{FF2B5EF4-FFF2-40B4-BE49-F238E27FC236}">
                 <a16:creationId xmlns:a16="http://schemas.microsoft.com/office/drawing/2014/main" id="{DEFF6756-8F95-5101-3F08-812C8E04D97B}"/>
               </a:ext>
             </a:extLst>
@@ -3961,7 +4470,7 @@
 </p:sld>
 </file>
 
-<file path=ppt/slides/slide11.xml><?xml version="1.0" encoding="utf-8"?>
+<file path=ppt/slides/slide14.xml><?xml version="1.0" encoding="utf-8"?>
 <p:sld xmlns:a="http://schemas.openxmlformats.org/drawingml/2006/main" xmlns:r="http://schemas.openxmlformats.org/officeDocument/2006/relationships" xmlns:p="http://schemas.openxmlformats.org/presentationml/2006/main">
   <p:cSld>
     <p:spTree>
@@ -4076,7 +4585,7 @@
 </p:sld>
 </file>
 
-<file path=ppt/slides/slide12.xml><?xml version="1.0" encoding="utf-8"?>
+<file path=ppt/slides/slide15.xml><?xml version="1.0" encoding="utf-8"?>
 <p:sld xmlns:a="http://schemas.openxmlformats.org/drawingml/2006/main" xmlns:r="http://schemas.openxmlformats.org/officeDocument/2006/relationships" xmlns:p="http://schemas.openxmlformats.org/presentationml/2006/main">
   <p:cSld>
     <p:spTree>
@@ -4192,7 +4701,7 @@
 </p:sld>
 </file>
 
-<file path=ppt/slides/slide13.xml><?xml version="1.0" encoding="utf-8"?>
+<file path=ppt/slides/slide16.xml><?xml version="1.0" encoding="utf-8"?>
 <p:sld xmlns:a="http://schemas.openxmlformats.org/drawingml/2006/main" xmlns:r="http://schemas.openxmlformats.org/officeDocument/2006/relationships" xmlns:p="http://schemas.openxmlformats.org/presentationml/2006/main">
   <p:cSld>
     <p:spTree>
@@ -4304,7 +4813,7 @@
 </p:sld>
 </file>
 
-<file path=ppt/slides/slide14.xml><?xml version="1.0" encoding="utf-8"?>
+<file path=ppt/slides/slide17.xml><?xml version="1.0" encoding="utf-8"?>
 <p:sld xmlns:a="http://schemas.openxmlformats.org/drawingml/2006/main" xmlns:r="http://schemas.openxmlformats.org/officeDocument/2006/relationships" xmlns:p="http://schemas.openxmlformats.org/presentationml/2006/main">
   <p:cSld>
     <p:spTree>
@@ -4420,7 +4929,7 @@
 </p:sld>
 </file>
 
-<file path=ppt/slides/slide15.xml><?xml version="1.0" encoding="utf-8"?>
+<file path=ppt/slides/slide18.xml><?xml version="1.0" encoding="utf-8"?>
 <p:sld xmlns:a="http://schemas.openxmlformats.org/drawingml/2006/main" xmlns:r="http://schemas.openxmlformats.org/officeDocument/2006/relationships" xmlns:p="http://schemas.openxmlformats.org/presentationml/2006/main">
   <p:cSld>
     <p:spTree>
@@ -4844,10 +5353,10 @@
       </p:grpSpPr>
       <p:sp>
         <p:nvSpPr>
-          <p:cNvPr id="2" name="Title 1">
-            <a:extLst>
-              <a:ext uri="{FF2B5EF4-FFF2-40B4-BE49-F238E27FC236}">
-                <a16:creationId xmlns:a16="http://schemas.microsoft.com/office/drawing/2014/main" id="{5ADC75F5-C1AC-2E0A-DC8F-5AB3D4932D64}"/>
+          <p:cNvPr id="4" name="Title 3">
+            <a:extLst>
+              <a:ext uri="{FF2B5EF4-FFF2-40B4-BE49-F238E27FC236}">
+                <a16:creationId xmlns:a16="http://schemas.microsoft.com/office/drawing/2014/main" id="{F47472BB-C336-54AB-EAA4-A2C491DD55DC}"/>
               </a:ext>
             </a:extLst>
           </p:cNvPr>
@@ -4867,71 +5376,39 @@
               <a:rPr lang="en-US" b="1" dirty="0"/>
               <a:t>Comparison of survival between Pathologic stage II and III</a:t>
             </a:r>
-          </a:p>
-        </p:txBody>
-      </p:sp>
-      <p:pic>
-        <p:nvPicPr>
-          <p:cNvPr id="7" name="Content Placeholder 6">
-            <a:extLst>
-              <a:ext uri="{FF2B5EF4-FFF2-40B4-BE49-F238E27FC236}">
-                <a16:creationId xmlns:a16="http://schemas.microsoft.com/office/drawing/2014/main" id="{293DE86D-471E-BA4F-8E28-5962DA7387C8}"/>
-              </a:ext>
-            </a:extLst>
-          </p:cNvPr>
-          <p:cNvPicPr>
-            <a:picLocks noGrp="1" noChangeAspect="1"/>
-          </p:cNvPicPr>
-          <p:nvPr>
-            <p:ph sz="half" idx="1"/>
-          </p:nvPr>
-        </p:nvPicPr>
-        <p:blipFill>
-          <a:blip r:embed="rId2"/>
-          <a:stretch>
-            <a:fillRect/>
-          </a:stretch>
-        </p:blipFill>
-        <p:spPr>
-          <a:xfrm>
-            <a:off x="838200" y="2420509"/>
-            <a:ext cx="5181600" cy="3161570"/>
-          </a:xfrm>
-        </p:spPr>
-      </p:pic>
-      <p:pic>
-        <p:nvPicPr>
-          <p:cNvPr id="14" name="Content Placeholder 13">
-            <a:extLst>
-              <a:ext uri="{FF2B5EF4-FFF2-40B4-BE49-F238E27FC236}">
-                <a16:creationId xmlns:a16="http://schemas.microsoft.com/office/drawing/2014/main" id="{52D5A103-2CA5-5A51-2245-AE98BAAD9B8C}"/>
-              </a:ext>
-            </a:extLst>
-          </p:cNvPr>
-          <p:cNvPicPr>
-            <a:picLocks noGrp="1" noChangeAspect="1"/>
-          </p:cNvPicPr>
-          <p:nvPr>
-            <p:ph sz="half" idx="2"/>
-          </p:nvPr>
-        </p:nvPicPr>
-        <p:blipFill>
-          <a:blip r:embed="rId3"/>
-          <a:stretch>
-            <a:fillRect/>
-          </a:stretch>
-        </p:blipFill>
-        <p:spPr>
-          <a:xfrm>
-            <a:off x="6172200" y="2351683"/>
-            <a:ext cx="5181600" cy="3299222"/>
-          </a:xfrm>
-        </p:spPr>
-      </p:pic>
+            <a:endParaRPr lang="en-US" dirty="0"/>
+          </a:p>
+        </p:txBody>
+      </p:sp>
+      <p:sp>
+        <p:nvSpPr>
+          <p:cNvPr id="5" name="Text Placeholder 4">
+            <a:extLst>
+              <a:ext uri="{FF2B5EF4-FFF2-40B4-BE49-F238E27FC236}">
+                <a16:creationId xmlns:a16="http://schemas.microsoft.com/office/drawing/2014/main" id="{06F3BF04-5431-F754-CBC6-D590156CD2D4}"/>
+              </a:ext>
+            </a:extLst>
+          </p:cNvPr>
+          <p:cNvSpPr>
+            <a:spLocks noGrp="1"/>
+          </p:cNvSpPr>
+          <p:nvPr>
+            <p:ph type="body" idx="1"/>
+          </p:nvPr>
+        </p:nvSpPr>
+        <p:spPr/>
+        <p:txBody>
+          <a:bodyPr/>
+          <a:lstStyle/>
+          <a:p>
+            <a:endParaRPr lang="en-US"/>
+          </a:p>
+        </p:txBody>
+      </p:sp>
     </p:spTree>
     <p:extLst>
       <p:ext uri="{BB962C8B-B14F-4D97-AF65-F5344CB8AC3E}">
-        <p14:creationId xmlns:p14="http://schemas.microsoft.com/office/powerpoint/2010/main" val="2313418591"/>
+        <p14:creationId xmlns:p14="http://schemas.microsoft.com/office/powerpoint/2010/main" val="397373999"/>
       </p:ext>
     </p:extLst>
   </p:cSld>
@@ -4963,7 +5440,7 @@
           <p:cNvPr id="2" name="Title 1">
             <a:extLst>
               <a:ext uri="{FF2B5EF4-FFF2-40B4-BE49-F238E27FC236}">
-                <a16:creationId xmlns:a16="http://schemas.microsoft.com/office/drawing/2014/main" id="{C35C89A8-13DD-131C-9246-8EE96577701F}"/>
+                <a16:creationId xmlns:a16="http://schemas.microsoft.com/office/drawing/2014/main" id="{5ADC75F5-C1AC-2E0A-DC8F-5AB3D4932D64}"/>
               </a:ext>
             </a:extLst>
           </p:cNvPr>
@@ -4981,18 +5458,17 @@
           <a:p>
             <a:r>
               <a:rPr lang="en-US" b="1" dirty="0"/>
-              <a:t>Comparison of survival between Pathologic stage II and III</a:t>
-            </a:r>
-            <a:endParaRPr lang="en-US" dirty="0"/>
+              <a:t>KM Plot :Pathologic stage II and III</a:t>
+            </a:r>
           </a:p>
         </p:txBody>
       </p:sp>
       <p:pic>
         <p:nvPicPr>
-          <p:cNvPr id="6" name="Content Placeholder 5">
-            <a:extLst>
-              <a:ext uri="{FF2B5EF4-FFF2-40B4-BE49-F238E27FC236}">
-                <a16:creationId xmlns:a16="http://schemas.microsoft.com/office/drawing/2014/main" id="{FA7D415A-2E5E-5FC8-8729-3C957EDDA3DD}"/>
+          <p:cNvPr id="7" name="Content Placeholder 6">
+            <a:extLst>
+              <a:ext uri="{FF2B5EF4-FFF2-40B4-BE49-F238E27FC236}">
+                <a16:creationId xmlns:a16="http://schemas.microsoft.com/office/drawing/2014/main" id="{293DE86D-471E-BA4F-8E28-5962DA7387C8}"/>
               </a:ext>
             </a:extLst>
           </p:cNvPr>
@@ -5011,8 +5487,8 @@
         </p:blipFill>
         <p:spPr>
           <a:xfrm>
-            <a:off x="838200" y="2483728"/>
-            <a:ext cx="5181600" cy="3035132"/>
+            <a:off x="838200" y="2420509"/>
+            <a:ext cx="5181600" cy="3161570"/>
           </a:xfrm>
         </p:spPr>
       </p:pic>
@@ -5021,7 +5497,7 @@
           <p:cNvPr id="4" name="Content Placeholder 3">
             <a:extLst>
               <a:ext uri="{FF2B5EF4-FFF2-40B4-BE49-F238E27FC236}">
-                <a16:creationId xmlns:a16="http://schemas.microsoft.com/office/drawing/2014/main" id="{ED8B9C8C-40C4-4964-8391-728FD82DDBF8}"/>
+                <a16:creationId xmlns:a16="http://schemas.microsoft.com/office/drawing/2014/main" id="{15F324C7-A5E4-B620-53C2-75E8D658AC8D}"/>
               </a:ext>
             </a:extLst>
           </p:cNvPr>
@@ -5034,38 +5510,64 @@
         </p:nvSpPr>
         <p:spPr/>
         <p:txBody>
-          <a:bodyPr/>
-          <a:lstStyle/>
-          <a:p>
-            <a:r>
-              <a:rPr lang="en-US" dirty="0">
-                <a:solidFill>
-                  <a:srgbClr val="FF0000"/>
-                </a:solidFill>
-              </a:rPr>
-              <a:t>ANSWERS</a:t>
-            </a:r>
-          </a:p>
-          <a:p>
-            <a:pPr marL="514350" indent="-514350">
-              <a:buFont typeface="+mj-lt"/>
-              <a:buAutoNum type="arabicPeriod"/>
-            </a:pPr>
-            <a:r>
-              <a:rPr lang="en-US" dirty="0">
-                <a:solidFill>
-                  <a:srgbClr val="FF0000"/>
-                </a:solidFill>
-              </a:rPr>
-              <a:t> </a:t>
-            </a:r>
+          <a:bodyPr>
+            <a:normAutofit fontScale="77500" lnSpcReduction="20000"/>
+          </a:bodyPr>
+          <a:lstStyle/>
+          <a:p>
+            <a:r>
+              <a:rPr lang="en-US" dirty="0"/>
+              <a:t>KM plot compares survival probabilities for patients with breast cancer pathologic stage II and III, and the table at the lower end includes number of people still alive at each time interval. </a:t>
+            </a:r>
+          </a:p>
+          <a:p>
+            <a:r>
+              <a:rPr lang="en-US" dirty="0"/>
+              <a:t>Initially, there is a steep decline in survival for pathologic stage 2 compared to stage 3</a:t>
+            </a:r>
+            <a:r>
+              <a:rPr lang="en-US" b="1" dirty="0"/>
+              <a:t>,(indicating a worse prognosis for group 3 </a:t>
+            </a:r>
+            <a:r>
+              <a:rPr lang="en-US" dirty="0"/>
+              <a:t>) .  Around 12 years both group has </a:t>
+            </a:r>
+            <a:r>
+              <a:rPr lang="en-US" b="1" dirty="0"/>
+              <a:t>equal</a:t>
+            </a:r>
+            <a:r>
+              <a:rPr lang="en-US" dirty="0"/>
+              <a:t> survival probability. </a:t>
+            </a:r>
+          </a:p>
+          <a:p>
+            <a:r>
+              <a:rPr lang="en-US" dirty="0"/>
+              <a:t>The shaded areas represent confidence intervals, which widen over time due to fewer patients remaining at risk, </a:t>
+            </a:r>
+            <a:r>
+              <a:rPr lang="en-US" b="1" dirty="0"/>
+              <a:t>increasing uncertainty(imprecision) </a:t>
+            </a:r>
+            <a:r>
+              <a:rPr lang="en-US" dirty="0"/>
+              <a:t>in survival estimates.</a:t>
+            </a:r>
+          </a:p>
+          <a:p>
+            <a:endParaRPr lang="en-US" dirty="0"/>
+          </a:p>
+          <a:p>
+            <a:endParaRPr lang="en-US" dirty="0"/>
           </a:p>
         </p:txBody>
       </p:sp>
     </p:spTree>
     <p:extLst>
       <p:ext uri="{BB962C8B-B14F-4D97-AF65-F5344CB8AC3E}">
-        <p14:creationId xmlns:p14="http://schemas.microsoft.com/office/powerpoint/2010/main" val="3725675970"/>
+        <p14:creationId xmlns:p14="http://schemas.microsoft.com/office/powerpoint/2010/main" val="2313418591"/>
       </p:ext>
     </p:extLst>
   </p:cSld>
@@ -5097,7 +5599,7 @@
           <p:cNvPr id="2" name="Title 1">
             <a:extLst>
               <a:ext uri="{FF2B5EF4-FFF2-40B4-BE49-F238E27FC236}">
-                <a16:creationId xmlns:a16="http://schemas.microsoft.com/office/drawing/2014/main" id="{7B05F310-ED71-9D65-DB0D-B916377EE141}"/>
+                <a16:creationId xmlns:a16="http://schemas.microsoft.com/office/drawing/2014/main" id="{4BB15E7E-0879-E749-5F50-54EB276BD533}"/>
               </a:ext>
             </a:extLst>
           </p:cNvPr>
@@ -5115,46 +5617,90 @@
           <a:p>
             <a:r>
               <a:rPr lang="en-US" b="1" dirty="0"/>
-              <a:t>Comparison of survival between Pathologic stage II and IV</a:t>
-            </a:r>
+              <a:t>Survival ratio plot: Pathologic stage II vs III</a:t>
+            </a:r>
+          </a:p>
+        </p:txBody>
+      </p:sp>
+      <p:sp>
+        <p:nvSpPr>
+          <p:cNvPr id="4" name="Content Placeholder 3">
+            <a:extLst>
+              <a:ext uri="{FF2B5EF4-FFF2-40B4-BE49-F238E27FC236}">
+                <a16:creationId xmlns:a16="http://schemas.microsoft.com/office/drawing/2014/main" id="{3BF3338C-B857-158A-8D8E-250A24562079}"/>
+              </a:ext>
+            </a:extLst>
+          </p:cNvPr>
+          <p:cNvSpPr>
+            <a:spLocks noGrp="1"/>
+          </p:cNvSpPr>
+          <p:nvPr>
+            <p:ph sz="half" idx="2"/>
+          </p:nvPr>
+        </p:nvSpPr>
+        <p:spPr/>
+        <p:txBody>
+          <a:bodyPr>
+            <a:normAutofit fontScale="62500" lnSpcReduction="20000"/>
+          </a:bodyPr>
+          <a:lstStyle/>
+          <a:p>
+            <a:r>
+              <a:rPr lang="en-US" dirty="0"/>
+              <a:t>The survival ratio plot compares the</a:t>
+            </a:r>
+            <a:r>
+              <a:rPr lang="en-US" dirty="0">
+                <a:solidFill>
+                  <a:srgbClr val="FF0000"/>
+                </a:solidFill>
+              </a:rPr>
+              <a:t> relative survival </a:t>
+            </a:r>
+            <a:r>
+              <a:rPr lang="en-US" dirty="0"/>
+              <a:t>between patients with pathologic stage II and stage III cancer over time, where </a:t>
+            </a:r>
+            <a:r>
+              <a:rPr lang="en-US" b="1" dirty="0"/>
+              <a:t>a value above 1 indicates higher survival for stage II and below 1 favors stage III.</a:t>
+            </a:r>
+          </a:p>
+          <a:p>
+            <a:r>
+              <a:rPr lang="en-US" dirty="0"/>
+              <a:t>Initially, the survival ratio is close to 1, but over time, the green line remains above no difference line, </a:t>
+            </a:r>
+            <a:r>
+              <a:rPr lang="en-US" b="1" dirty="0"/>
+              <a:t>suggesting that patients with stage II cancer have a better prognosis compared to those with stage III.</a:t>
+            </a:r>
+          </a:p>
+          <a:p>
+            <a:r>
+              <a:rPr lang="en-US" dirty="0"/>
+              <a:t>The purple-shaded region represents the 95% confidence interval, which widens over time due to fewer patients remaining at risk, increasing </a:t>
+            </a:r>
+            <a:r>
+              <a:rPr lang="en-US" b="1" dirty="0"/>
+              <a:t>uncertainty in the estimation of prognosis.</a:t>
+            </a:r>
+          </a:p>
+          <a:p>
+            <a:r>
+              <a:rPr lang="en-US" dirty="0"/>
+              <a:t>Around 10 to 15 years, the survival ratio drops closer to 1 and below, indicating that survival differences between the two stages decrease, but overall, stage II maintains a survival advantage over stage III</a:t>
+            </a:r>
+            <a:endParaRPr lang="en-US" b="1" dirty="0"/>
           </a:p>
         </p:txBody>
       </p:sp>
       <p:pic>
         <p:nvPicPr>
-          <p:cNvPr id="10" name="Content Placeholder 9">
-            <a:extLst>
-              <a:ext uri="{FF2B5EF4-FFF2-40B4-BE49-F238E27FC236}">
-                <a16:creationId xmlns:a16="http://schemas.microsoft.com/office/drawing/2014/main" id="{3EC7EB07-3C8A-F36C-F827-2E12D30F6EDE}"/>
-              </a:ext>
-            </a:extLst>
-          </p:cNvPr>
-          <p:cNvPicPr>
-            <a:picLocks noGrp="1" noChangeAspect="1"/>
-          </p:cNvPicPr>
-          <p:nvPr>
-            <p:ph sz="half" idx="2"/>
-          </p:nvPr>
-        </p:nvPicPr>
-        <p:blipFill>
-          <a:blip r:embed="rId2"/>
-          <a:stretch>
-            <a:fillRect/>
-          </a:stretch>
-        </p:blipFill>
-        <p:spPr>
-          <a:xfrm>
-            <a:off x="6172200" y="2364598"/>
-            <a:ext cx="5181600" cy="3273391"/>
-          </a:xfrm>
-        </p:spPr>
-      </p:pic>
-      <p:pic>
-        <p:nvPicPr>
-          <p:cNvPr id="16" name="Content Placeholder 15">
-            <a:extLst>
-              <a:ext uri="{FF2B5EF4-FFF2-40B4-BE49-F238E27FC236}">
-                <a16:creationId xmlns:a16="http://schemas.microsoft.com/office/drawing/2014/main" id="{4E4DFC0F-2F32-5851-4461-EBFB3A404F99}"/>
+          <p:cNvPr id="5" name="Content Placeholder 13">
+            <a:extLst>
+              <a:ext uri="{FF2B5EF4-FFF2-40B4-BE49-F238E27FC236}">
+                <a16:creationId xmlns:a16="http://schemas.microsoft.com/office/drawing/2014/main" id="{E73190DE-7835-B728-4CAE-994338B51CA5}"/>
               </a:ext>
             </a:extLst>
           </p:cNvPr>
@@ -5173,15 +5719,15 @@
         </p:blipFill>
         <p:spPr>
           <a:xfrm>
-            <a:off x="838200" y="2392271"/>
-            <a:ext cx="5181600" cy="3218046"/>
+            <a:off x="838200" y="2351683"/>
+            <a:ext cx="5181600" cy="3299222"/>
           </a:xfrm>
         </p:spPr>
       </p:pic>
     </p:spTree>
     <p:extLst>
       <p:ext uri="{BB962C8B-B14F-4D97-AF65-F5344CB8AC3E}">
-        <p14:creationId xmlns:p14="http://schemas.microsoft.com/office/powerpoint/2010/main" val="3512753403"/>
+        <p14:creationId xmlns:p14="http://schemas.microsoft.com/office/powerpoint/2010/main" val="3771691677"/>
       </p:ext>
     </p:extLst>
   </p:cSld>
@@ -5213,7 +5759,7 @@
           <p:cNvPr id="2" name="Title 1">
             <a:extLst>
               <a:ext uri="{FF2B5EF4-FFF2-40B4-BE49-F238E27FC236}">
-                <a16:creationId xmlns:a16="http://schemas.microsoft.com/office/drawing/2014/main" id="{0A5867AA-ABE1-BFC6-14CF-BE54ADB2A5F4}"/>
+                <a16:creationId xmlns:a16="http://schemas.microsoft.com/office/drawing/2014/main" id="{C35C89A8-13DD-131C-9246-8EE96577701F}"/>
               </a:ext>
             </a:extLst>
           </p:cNvPr>
@@ -5229,7 +5775,11 @@
           <a:bodyPr/>
           <a:lstStyle/>
           <a:p>
-            <a:endParaRPr lang="en-US"/>
+            <a:r>
+              <a:rPr lang="en-US" b="1" dirty="0"/>
+              <a:t>Survival difference plot: Pathologic stage II vs III</a:t>
+            </a:r>
+            <a:endParaRPr lang="en-US" dirty="0"/>
           </a:p>
         </p:txBody>
       </p:sp>
@@ -5238,7 +5788,7 @@
           <p:cNvPr id="6" name="Content Placeholder 5">
             <a:extLst>
               <a:ext uri="{FF2B5EF4-FFF2-40B4-BE49-F238E27FC236}">
-                <a16:creationId xmlns:a16="http://schemas.microsoft.com/office/drawing/2014/main" id="{43B5CA57-09CB-A6C7-5880-5B7F7FD708EB}"/>
+                <a16:creationId xmlns:a16="http://schemas.microsoft.com/office/drawing/2014/main" id="{FA7D415A-2E5E-5FC8-8729-3C957EDDA3DD}"/>
               </a:ext>
             </a:extLst>
           </p:cNvPr>
@@ -5250,15 +5800,15 @@
           </p:nvPr>
         </p:nvPicPr>
         <p:blipFill>
-          <a:blip r:embed="rId2"/>
+          <a:blip r:embed="rId3"/>
           <a:stretch>
             <a:fillRect/>
           </a:stretch>
         </p:blipFill>
         <p:spPr>
           <a:xfrm>
-            <a:off x="838200" y="2399312"/>
-            <a:ext cx="5181600" cy="3203964"/>
+            <a:off x="838200" y="2483728"/>
+            <a:ext cx="5181600" cy="3035132"/>
           </a:xfrm>
         </p:spPr>
       </p:pic>
@@ -5267,7 +5817,7 @@
           <p:cNvPr id="4" name="Content Placeholder 3">
             <a:extLst>
               <a:ext uri="{FF2B5EF4-FFF2-40B4-BE49-F238E27FC236}">
-                <a16:creationId xmlns:a16="http://schemas.microsoft.com/office/drawing/2014/main" id="{251E9359-3D55-1618-2144-D5571F605AAA}"/>
+                <a16:creationId xmlns:a16="http://schemas.microsoft.com/office/drawing/2014/main" id="{ED8B9C8C-40C4-4964-8391-728FD82DDBF8}"/>
               </a:ext>
             </a:extLst>
           </p:cNvPr>
@@ -5280,17 +5830,72 @@
         </p:nvSpPr>
         <p:spPr/>
         <p:txBody>
-          <a:bodyPr/>
-          <a:lstStyle/>
-          <a:p>
-            <a:endParaRPr lang="en-US"/>
+          <a:bodyPr>
+            <a:normAutofit fontScale="62500" lnSpcReduction="20000"/>
+          </a:bodyPr>
+          <a:lstStyle/>
+          <a:p>
+            <a:r>
+              <a:rPr lang="en-US" dirty="0"/>
+              <a:t>This plot compares the </a:t>
+            </a:r>
+            <a:r>
+              <a:rPr lang="en-US" dirty="0">
+                <a:solidFill>
+                  <a:srgbClr val="FF0000"/>
+                </a:solidFill>
+              </a:rPr>
+              <a:t>absolute difference </a:t>
+            </a:r>
+            <a:r>
+              <a:rPr lang="en-US" dirty="0"/>
+              <a:t>in survival probabilities between pathologic stage II and stage III cancer over time, with positive values indicating better survival for stage II.</a:t>
+            </a:r>
+          </a:p>
+          <a:p>
+            <a:r>
+              <a:rPr lang="en-US" dirty="0"/>
+              <a:t>The green survival difference line remains above the no-difference line for most of the timeline, indicating that </a:t>
+            </a:r>
+            <a:r>
+              <a:rPr lang="en-US" b="1" dirty="0"/>
+              <a:t>stage II patients generally have better prognosis than stage III patients</a:t>
+            </a:r>
+            <a:r>
+              <a:rPr lang="en-US" dirty="0"/>
+              <a:t>.</a:t>
+            </a:r>
+          </a:p>
+          <a:p>
+            <a:r>
+              <a:rPr lang="en-US" dirty="0"/>
+              <a:t>The shaded purple region represents the 95% confidence interval, which widens as time progresses, reflecting increased uncertainty(imprecision)  due to fewer patients at risk.</a:t>
+            </a:r>
+          </a:p>
+          <a:p>
+            <a:r>
+              <a:rPr lang="en-US" dirty="0"/>
+              <a:t>After approximately 15 years, the survival difference approaches zero and even dips slightly below, suggesting that long-term survival differences between the two stages diminish over time.</a:t>
+            </a:r>
+          </a:p>
+          <a:p>
+            <a:endParaRPr lang="en-US" dirty="0"/>
+          </a:p>
+          <a:p>
+            <a:endParaRPr lang="en-US" dirty="0"/>
+          </a:p>
+          <a:p>
+            <a:pPr marL="0" indent="0">
+              <a:buNone/>
+            </a:pPr>
+            <a:endParaRPr lang="en-US" dirty="0"/>
           </a:p>
         </p:txBody>
       </p:sp>
     </p:spTree>
     <p:extLst>
       <p:ext uri="{BB962C8B-B14F-4D97-AF65-F5344CB8AC3E}">
-        <p14:creationId xmlns:p14="http://schemas.microsoft.com/office/powerpoint/2010/main" val="1706119969"/>
+        <p14:creationId xmlns:p14="http://schemas.microsoft.com/office/powerpoint/2010/main" val="3725675970"/>
       </p:ext>
     </p:extLst>
   </p:cSld>
@@ -5322,7 +5927,7 @@
           <p:cNvPr id="2" name="Title 1">
             <a:extLst>
               <a:ext uri="{FF2B5EF4-FFF2-40B4-BE49-F238E27FC236}">
-                <a16:creationId xmlns:a16="http://schemas.microsoft.com/office/drawing/2014/main" id="{4F803FAB-AB4E-ECEB-B87D-CF608FC42219}"/>
+                <a16:creationId xmlns:a16="http://schemas.microsoft.com/office/drawing/2014/main" id="{5278A7CC-2581-232C-5A9A-1CA1F1578C00}"/>
               </a:ext>
             </a:extLst>
           </p:cNvPr>
@@ -5338,75 +5943,64 @@
           <a:bodyPr/>
           <a:lstStyle/>
           <a:p>
-            <a:r>
-              <a:rPr lang="en-US" b="1" dirty="0"/>
-              <a:t>Comparison of survival between Pathologic stage I and II</a:t>
-            </a:r>
-          </a:p>
-        </p:txBody>
-      </p:sp>
-      <p:pic>
-        <p:nvPicPr>
-          <p:cNvPr id="12" name="Content Placeholder 11">
-            <a:extLst>
-              <a:ext uri="{FF2B5EF4-FFF2-40B4-BE49-F238E27FC236}">
-                <a16:creationId xmlns:a16="http://schemas.microsoft.com/office/drawing/2014/main" id="{DBBCD6A8-BE88-6622-B2CC-427706A4EA86}"/>
-              </a:ext>
-            </a:extLst>
-          </p:cNvPr>
-          <p:cNvPicPr>
-            <a:picLocks noGrp="1" noChangeAspect="1"/>
-          </p:cNvPicPr>
+            <a:endParaRPr lang="en-US"/>
+          </a:p>
+        </p:txBody>
+      </p:sp>
+      <p:sp>
+        <p:nvSpPr>
+          <p:cNvPr id="3" name="Content Placeholder 2">
+            <a:extLst>
+              <a:ext uri="{FF2B5EF4-FFF2-40B4-BE49-F238E27FC236}">
+                <a16:creationId xmlns:a16="http://schemas.microsoft.com/office/drawing/2014/main" id="{2AC43A4E-04B8-5A0A-D82A-DC0C97B15FAF}"/>
+              </a:ext>
+            </a:extLst>
+          </p:cNvPr>
+          <p:cNvSpPr>
+            <a:spLocks noGrp="1"/>
+          </p:cNvSpPr>
+          <p:nvPr>
+            <p:ph sz="half" idx="1"/>
+          </p:nvPr>
+        </p:nvSpPr>
+        <p:spPr/>
+        <p:txBody>
+          <a:bodyPr/>
+          <a:lstStyle/>
+          <a:p>
+            <a:endParaRPr lang="en-US"/>
+          </a:p>
+        </p:txBody>
+      </p:sp>
+      <p:sp>
+        <p:nvSpPr>
+          <p:cNvPr id="4" name="Content Placeholder 3">
+            <a:extLst>
+              <a:ext uri="{FF2B5EF4-FFF2-40B4-BE49-F238E27FC236}">
+                <a16:creationId xmlns:a16="http://schemas.microsoft.com/office/drawing/2014/main" id="{1934301B-D6CC-4A94-8BE3-83449D12AE51}"/>
+              </a:ext>
+            </a:extLst>
+          </p:cNvPr>
+          <p:cNvSpPr>
+            <a:spLocks noGrp="1"/>
+          </p:cNvSpPr>
           <p:nvPr>
             <p:ph sz="half" idx="2"/>
           </p:nvPr>
-        </p:nvPicPr>
-        <p:blipFill>
-          <a:blip r:embed="rId2"/>
-          <a:stretch>
-            <a:fillRect/>
-          </a:stretch>
-        </p:blipFill>
-        <p:spPr>
-          <a:xfrm>
-            <a:off x="6172200" y="2385795"/>
-            <a:ext cx="5181600" cy="3230997"/>
-          </a:xfrm>
-        </p:spPr>
-      </p:pic>
-      <p:pic>
-        <p:nvPicPr>
-          <p:cNvPr id="6" name="Content Placeholder 5">
-            <a:extLst>
-              <a:ext uri="{FF2B5EF4-FFF2-40B4-BE49-F238E27FC236}">
-                <a16:creationId xmlns:a16="http://schemas.microsoft.com/office/drawing/2014/main" id="{9C01982B-C606-776A-3844-2B12D74BC582}"/>
-              </a:ext>
-            </a:extLst>
-          </p:cNvPr>
-          <p:cNvPicPr>
-            <a:picLocks noGrp="1" noChangeAspect="1"/>
-          </p:cNvPicPr>
-          <p:nvPr>
-            <p:ph sz="half" idx="1"/>
-          </p:nvPr>
-        </p:nvPicPr>
-        <p:blipFill>
-          <a:blip r:embed="rId3"/>
-          <a:stretch>
-            <a:fillRect/>
-          </a:stretch>
-        </p:blipFill>
-        <p:spPr>
-          <a:xfrm>
-            <a:off x="838200" y="2452446"/>
-            <a:ext cx="5181600" cy="3097695"/>
-          </a:xfrm>
-        </p:spPr>
-      </p:pic>
+        </p:nvSpPr>
+        <p:spPr/>
+        <p:txBody>
+          <a:bodyPr/>
+          <a:lstStyle/>
+          <a:p>
+            <a:endParaRPr lang="en-US"/>
+          </a:p>
+        </p:txBody>
+      </p:sp>
     </p:spTree>
     <p:extLst>
       <p:ext uri="{BB962C8B-B14F-4D97-AF65-F5344CB8AC3E}">
-        <p14:creationId xmlns:p14="http://schemas.microsoft.com/office/powerpoint/2010/main" val="3437497039"/>
+        <p14:creationId xmlns:p14="http://schemas.microsoft.com/office/powerpoint/2010/main" val="3693609078"/>
       </p:ext>
     </p:extLst>
   </p:cSld>
@@ -5438,7 +6032,7 @@
           <p:cNvPr id="2" name="Title 1">
             <a:extLst>
               <a:ext uri="{FF2B5EF4-FFF2-40B4-BE49-F238E27FC236}">
-                <a16:creationId xmlns:a16="http://schemas.microsoft.com/office/drawing/2014/main" id="{F0E93CA7-2387-85CD-98A2-89153EFD7CE9}"/>
+                <a16:creationId xmlns:a16="http://schemas.microsoft.com/office/drawing/2014/main" id="{7B05F310-ED71-9D65-DB0D-B916377EE141}"/>
               </a:ext>
             </a:extLst>
           </p:cNvPr>
@@ -5456,18 +6050,17 @@
           <a:p>
             <a:r>
               <a:rPr lang="en-US" b="1" dirty="0"/>
-              <a:t>Comparison of survival between Pathologic stage I and II</a:t>
-            </a:r>
-            <a:endParaRPr lang="en-US" dirty="0"/>
+              <a:t>Comparison of survival between Pathologic stage II and IV</a:t>
+            </a:r>
           </a:p>
         </p:txBody>
       </p:sp>
       <p:pic>
         <p:nvPicPr>
-          <p:cNvPr id="6" name="Content Placeholder 5">
-            <a:extLst>
-              <a:ext uri="{FF2B5EF4-FFF2-40B4-BE49-F238E27FC236}">
-                <a16:creationId xmlns:a16="http://schemas.microsoft.com/office/drawing/2014/main" id="{9E333A2F-DE77-44D2-6259-95D2A281717D}"/>
+          <p:cNvPr id="10" name="Content Placeholder 9">
+            <a:extLst>
+              <a:ext uri="{FF2B5EF4-FFF2-40B4-BE49-F238E27FC236}">
+                <a16:creationId xmlns:a16="http://schemas.microsoft.com/office/drawing/2014/main" id="{3EC7EB07-3C8A-F36C-F827-2E12D30F6EDE}"/>
               </a:ext>
             </a:extLst>
           </p:cNvPr>
@@ -5475,7 +6068,7 @@
             <a:picLocks noGrp="1" noChangeAspect="1"/>
           </p:cNvPicPr>
           <p:nvPr>
-            <p:ph sz="half" idx="1"/>
+            <p:ph sz="half" idx="2"/>
           </p:nvPr>
         </p:nvPicPr>
         <p:blipFill>
@@ -5486,40 +6079,44 @@
         </p:blipFill>
         <p:spPr>
           <a:xfrm>
-            <a:off x="838200" y="2446814"/>
-            <a:ext cx="5181600" cy="3108959"/>
+            <a:off x="6172200" y="2364598"/>
+            <a:ext cx="5181600" cy="3273391"/>
           </a:xfrm>
         </p:spPr>
       </p:pic>
-      <p:sp>
-        <p:nvSpPr>
-          <p:cNvPr id="4" name="Content Placeholder 3">
-            <a:extLst>
-              <a:ext uri="{FF2B5EF4-FFF2-40B4-BE49-F238E27FC236}">
-                <a16:creationId xmlns:a16="http://schemas.microsoft.com/office/drawing/2014/main" id="{209E8BC9-F17E-7D49-33D1-5154892B61C2}"/>
-              </a:ext>
-            </a:extLst>
-          </p:cNvPr>
-          <p:cNvSpPr>
-            <a:spLocks noGrp="1"/>
-          </p:cNvSpPr>
-          <p:nvPr>
-            <p:ph sz="half" idx="2"/>
-          </p:nvPr>
-        </p:nvSpPr>
-        <p:spPr/>
-        <p:txBody>
-          <a:bodyPr/>
-          <a:lstStyle/>
-          <a:p>
-            <a:endParaRPr lang="en-US"/>
-          </a:p>
-        </p:txBody>
-      </p:sp>
+      <p:pic>
+        <p:nvPicPr>
+          <p:cNvPr id="16" name="Content Placeholder 15">
+            <a:extLst>
+              <a:ext uri="{FF2B5EF4-FFF2-40B4-BE49-F238E27FC236}">
+                <a16:creationId xmlns:a16="http://schemas.microsoft.com/office/drawing/2014/main" id="{4E4DFC0F-2F32-5851-4461-EBFB3A404F99}"/>
+              </a:ext>
+            </a:extLst>
+          </p:cNvPr>
+          <p:cNvPicPr>
+            <a:picLocks noGrp="1" noChangeAspect="1"/>
+          </p:cNvPicPr>
+          <p:nvPr>
+            <p:ph sz="half" idx="1"/>
+          </p:nvPr>
+        </p:nvPicPr>
+        <p:blipFill>
+          <a:blip r:embed="rId3"/>
+          <a:stretch>
+            <a:fillRect/>
+          </a:stretch>
+        </p:blipFill>
+        <p:spPr>
+          <a:xfrm>
+            <a:off x="838200" y="2392271"/>
+            <a:ext cx="5181600" cy="3218046"/>
+          </a:xfrm>
+        </p:spPr>
+      </p:pic>
     </p:spTree>
     <p:extLst>
       <p:ext uri="{BB962C8B-B14F-4D97-AF65-F5344CB8AC3E}">
-        <p14:creationId xmlns:p14="http://schemas.microsoft.com/office/powerpoint/2010/main" val="2445845414"/>
+        <p14:creationId xmlns:p14="http://schemas.microsoft.com/office/powerpoint/2010/main" val="3512753403"/>
       </p:ext>
     </p:extLst>
   </p:cSld>

</xml_diff>